<commit_message>
Edit sequence diagrams and png image
</commit_message>
<xml_diff>
--- a/docs/diagrams/AddSubSequenceDiagram.pptx
+++ b/docs/diagrams/AddSubSequenceDiagram.pptx
@@ -107,6 +107,11 @@
       </a:defRPr>
     </a:lvl9pPr>
   </p:defaultTextStyle>
+  <p:extLst>
+    <p:ext uri="{EFAFB233-063F-42B5-8137-9DF3F51BA10A}">
+      <p15:sldGuideLst xmlns:p15="http://schemas.microsoft.com/office/powerpoint/2012/main"/>
+    </p:ext>
+  </p:extLst>
 </p:presentation>
 </file>
 
@@ -192,7 +197,7 @@
           <a:p>
             <a:fld id="{565BC63F-3241-42D3-984A-D618D963D8E9}" type="datetimeFigureOut">
               <a:rPr lang="en-SG" smtClean="0"/>
-              <a:t>16/10/2018</a:t>
+              <a:t>10/11/2018</a:t>
             </a:fld>
             <a:endParaRPr lang="en-SG"/>
           </a:p>
@@ -256,35 +261,35 @@
           <a:p>
             <a:pPr lvl="0"/>
             <a:r>
-              <a:rPr lang="en-US" smtClean="0"/>
+              <a:rPr lang="en-US"/>
               <a:t>Edit Master text styles</a:t>
             </a:r>
           </a:p>
           <a:p>
             <a:pPr lvl="1"/>
             <a:r>
-              <a:rPr lang="en-US" smtClean="0"/>
+              <a:rPr lang="en-US"/>
               <a:t>Second level</a:t>
             </a:r>
           </a:p>
           <a:p>
             <a:pPr lvl="2"/>
             <a:r>
-              <a:rPr lang="en-US" smtClean="0"/>
+              <a:rPr lang="en-US"/>
               <a:t>Third level</a:t>
             </a:r>
           </a:p>
           <a:p>
             <a:pPr lvl="3"/>
             <a:r>
-              <a:rPr lang="en-US" smtClean="0"/>
+              <a:rPr lang="en-US"/>
               <a:t>Fourth level</a:t>
             </a:r>
           </a:p>
           <a:p>
             <a:pPr lvl="4"/>
             <a:r>
-              <a:rPr lang="en-US" smtClean="0"/>
+              <a:rPr lang="en-US"/>
               <a:t>Fifth level</a:t>
             </a:r>
             <a:endParaRPr lang="en-SG"/>
@@ -505,7 +510,7 @@
           <a:lstStyle/>
           <a:p>
             <a:r>
-              <a:rPr lang="en-SG" dirty="0" smtClean="0"/>
+              <a:rPr lang="en-SG" dirty="0"/>
               <a:t>Group Sequence Diagram</a:t>
             </a:r>
             <a:endParaRPr lang="en-US" dirty="0"/>
@@ -590,7 +595,7 @@
           </a:lstStyle>
           <a:p>
             <a:r>
-              <a:rPr lang="en-US" smtClean="0"/>
+              <a:rPr lang="en-US"/>
               <a:t>Click to edit Master title style</a:t>
             </a:r>
             <a:endParaRPr lang="en-SG"/>
@@ -655,7 +660,7 @@
           </a:lstStyle>
           <a:p>
             <a:r>
-              <a:rPr lang="en-US" smtClean="0"/>
+              <a:rPr lang="en-US"/>
               <a:t>Click to edit Master subtitle style</a:t>
             </a:r>
             <a:endParaRPr lang="en-SG"/>
@@ -679,7 +684,7 @@
           <a:p>
             <a:fld id="{E085CA00-3891-40E4-8741-D44C4E943D8D}" type="datetimeFigureOut">
               <a:rPr lang="en-SG" smtClean="0"/>
-              <a:t>16/10/2018</a:t>
+              <a:t>10/11/2018</a:t>
             </a:fld>
             <a:endParaRPr lang="en-SG"/>
           </a:p>
@@ -773,7 +778,7 @@
           <a:lstStyle/>
           <a:p>
             <a:r>
-              <a:rPr lang="en-US" smtClean="0"/>
+              <a:rPr lang="en-US"/>
               <a:t>Click to edit Master title style</a:t>
             </a:r>
             <a:endParaRPr lang="en-SG"/>
@@ -797,35 +802,35 @@
           <a:p>
             <a:pPr lvl="0"/>
             <a:r>
-              <a:rPr lang="en-US" smtClean="0"/>
+              <a:rPr lang="en-US"/>
               <a:t>Edit Master text styles</a:t>
             </a:r>
           </a:p>
           <a:p>
             <a:pPr lvl="1"/>
             <a:r>
-              <a:rPr lang="en-US" smtClean="0"/>
+              <a:rPr lang="en-US"/>
               <a:t>Second level</a:t>
             </a:r>
           </a:p>
           <a:p>
             <a:pPr lvl="2"/>
             <a:r>
-              <a:rPr lang="en-US" smtClean="0"/>
+              <a:rPr lang="en-US"/>
               <a:t>Third level</a:t>
             </a:r>
           </a:p>
           <a:p>
             <a:pPr lvl="3"/>
             <a:r>
-              <a:rPr lang="en-US" smtClean="0"/>
+              <a:rPr lang="en-US"/>
               <a:t>Fourth level</a:t>
             </a:r>
           </a:p>
           <a:p>
             <a:pPr lvl="4"/>
             <a:r>
-              <a:rPr lang="en-US" smtClean="0"/>
+              <a:rPr lang="en-US"/>
               <a:t>Fifth level</a:t>
             </a:r>
             <a:endParaRPr lang="en-SG"/>
@@ -849,7 +854,7 @@
           <a:p>
             <a:fld id="{E085CA00-3891-40E4-8741-D44C4E943D8D}" type="datetimeFigureOut">
               <a:rPr lang="en-SG" smtClean="0"/>
-              <a:t>16/10/2018</a:t>
+              <a:t>10/11/2018</a:t>
             </a:fld>
             <a:endParaRPr lang="en-SG"/>
           </a:p>
@@ -948,7 +953,7 @@
           <a:lstStyle/>
           <a:p>
             <a:r>
-              <a:rPr lang="en-US" smtClean="0"/>
+              <a:rPr lang="en-US"/>
               <a:t>Click to edit Master title style</a:t>
             </a:r>
             <a:endParaRPr lang="en-SG"/>
@@ -977,35 +982,35 @@
           <a:p>
             <a:pPr lvl="0"/>
             <a:r>
-              <a:rPr lang="en-US" smtClean="0"/>
+              <a:rPr lang="en-US"/>
               <a:t>Edit Master text styles</a:t>
             </a:r>
           </a:p>
           <a:p>
             <a:pPr lvl="1"/>
             <a:r>
-              <a:rPr lang="en-US" smtClean="0"/>
+              <a:rPr lang="en-US"/>
               <a:t>Second level</a:t>
             </a:r>
           </a:p>
           <a:p>
             <a:pPr lvl="2"/>
             <a:r>
-              <a:rPr lang="en-US" smtClean="0"/>
+              <a:rPr lang="en-US"/>
               <a:t>Third level</a:t>
             </a:r>
           </a:p>
           <a:p>
             <a:pPr lvl="3"/>
             <a:r>
-              <a:rPr lang="en-US" smtClean="0"/>
+              <a:rPr lang="en-US"/>
               <a:t>Fourth level</a:t>
             </a:r>
           </a:p>
           <a:p>
             <a:pPr lvl="4"/>
             <a:r>
-              <a:rPr lang="en-US" smtClean="0"/>
+              <a:rPr lang="en-US"/>
               <a:t>Fifth level</a:t>
             </a:r>
             <a:endParaRPr lang="en-SG"/>
@@ -1029,7 +1034,7 @@
           <a:p>
             <a:fld id="{E085CA00-3891-40E4-8741-D44C4E943D8D}" type="datetimeFigureOut">
               <a:rPr lang="en-SG" smtClean="0"/>
-              <a:t>16/10/2018</a:t>
+              <a:t>10/11/2018</a:t>
             </a:fld>
             <a:endParaRPr lang="en-SG"/>
           </a:p>
@@ -1123,7 +1128,7 @@
           <a:lstStyle/>
           <a:p>
             <a:r>
-              <a:rPr lang="en-US" smtClean="0"/>
+              <a:rPr lang="en-US"/>
               <a:t>Click to edit Master title style</a:t>
             </a:r>
             <a:endParaRPr lang="en-SG"/>
@@ -1147,35 +1152,35 @@
           <a:p>
             <a:pPr lvl="0"/>
             <a:r>
-              <a:rPr lang="en-US" smtClean="0"/>
+              <a:rPr lang="en-US"/>
               <a:t>Edit Master text styles</a:t>
             </a:r>
           </a:p>
           <a:p>
             <a:pPr lvl="1"/>
             <a:r>
-              <a:rPr lang="en-US" smtClean="0"/>
+              <a:rPr lang="en-US"/>
               <a:t>Second level</a:t>
             </a:r>
           </a:p>
           <a:p>
             <a:pPr lvl="2"/>
             <a:r>
-              <a:rPr lang="en-US" smtClean="0"/>
+              <a:rPr lang="en-US"/>
               <a:t>Third level</a:t>
             </a:r>
           </a:p>
           <a:p>
             <a:pPr lvl="3"/>
             <a:r>
-              <a:rPr lang="en-US" smtClean="0"/>
+              <a:rPr lang="en-US"/>
               <a:t>Fourth level</a:t>
             </a:r>
           </a:p>
           <a:p>
             <a:pPr lvl="4"/>
             <a:r>
-              <a:rPr lang="en-US" smtClean="0"/>
+              <a:rPr lang="en-US"/>
               <a:t>Fifth level</a:t>
             </a:r>
             <a:endParaRPr lang="en-SG"/>
@@ -1199,7 +1204,7 @@
           <a:p>
             <a:fld id="{E085CA00-3891-40E4-8741-D44C4E943D8D}" type="datetimeFigureOut">
               <a:rPr lang="en-SG" smtClean="0"/>
-              <a:t>16/10/2018</a:t>
+              <a:t>10/11/2018</a:t>
             </a:fld>
             <a:endParaRPr lang="en-SG"/>
           </a:p>
@@ -1302,7 +1307,7 @@
           </a:lstStyle>
           <a:p>
             <a:r>
-              <a:rPr lang="en-US" smtClean="0"/>
+              <a:rPr lang="en-US"/>
               <a:t>Click to edit Master title style</a:t>
             </a:r>
             <a:endParaRPr lang="en-SG"/>
@@ -1422,7 +1427,7 @@
           <a:p>
             <a:pPr lvl="0"/>
             <a:r>
-              <a:rPr lang="en-US" smtClean="0"/>
+              <a:rPr lang="en-US"/>
               <a:t>Edit Master text styles</a:t>
             </a:r>
           </a:p>
@@ -1445,7 +1450,7 @@
           <a:p>
             <a:fld id="{E085CA00-3891-40E4-8741-D44C4E943D8D}" type="datetimeFigureOut">
               <a:rPr lang="en-SG" smtClean="0"/>
-              <a:t>16/10/2018</a:t>
+              <a:t>10/11/2018</a:t>
             </a:fld>
             <a:endParaRPr lang="en-SG"/>
           </a:p>
@@ -1539,7 +1544,7 @@
           <a:lstStyle/>
           <a:p>
             <a:r>
-              <a:rPr lang="en-US" smtClean="0"/>
+              <a:rPr lang="en-US"/>
               <a:t>Click to edit Master title style</a:t>
             </a:r>
             <a:endParaRPr lang="en-SG"/>
@@ -1568,35 +1573,35 @@
           <a:p>
             <a:pPr lvl="0"/>
             <a:r>
-              <a:rPr lang="en-US" smtClean="0"/>
+              <a:rPr lang="en-US"/>
               <a:t>Edit Master text styles</a:t>
             </a:r>
           </a:p>
           <a:p>
             <a:pPr lvl="1"/>
             <a:r>
-              <a:rPr lang="en-US" smtClean="0"/>
+              <a:rPr lang="en-US"/>
               <a:t>Second level</a:t>
             </a:r>
           </a:p>
           <a:p>
             <a:pPr lvl="2"/>
             <a:r>
-              <a:rPr lang="en-US" smtClean="0"/>
+              <a:rPr lang="en-US"/>
               <a:t>Third level</a:t>
             </a:r>
           </a:p>
           <a:p>
             <a:pPr lvl="3"/>
             <a:r>
-              <a:rPr lang="en-US" smtClean="0"/>
+              <a:rPr lang="en-US"/>
               <a:t>Fourth level</a:t>
             </a:r>
           </a:p>
           <a:p>
             <a:pPr lvl="4"/>
             <a:r>
-              <a:rPr lang="en-US" smtClean="0"/>
+              <a:rPr lang="en-US"/>
               <a:t>Fifth level</a:t>
             </a:r>
             <a:endParaRPr lang="en-SG"/>
@@ -1625,35 +1630,35 @@
           <a:p>
             <a:pPr lvl="0"/>
             <a:r>
-              <a:rPr lang="en-US" smtClean="0"/>
+              <a:rPr lang="en-US"/>
               <a:t>Edit Master text styles</a:t>
             </a:r>
           </a:p>
           <a:p>
             <a:pPr lvl="1"/>
             <a:r>
-              <a:rPr lang="en-US" smtClean="0"/>
+              <a:rPr lang="en-US"/>
               <a:t>Second level</a:t>
             </a:r>
           </a:p>
           <a:p>
             <a:pPr lvl="2"/>
             <a:r>
-              <a:rPr lang="en-US" smtClean="0"/>
+              <a:rPr lang="en-US"/>
               <a:t>Third level</a:t>
             </a:r>
           </a:p>
           <a:p>
             <a:pPr lvl="3"/>
             <a:r>
-              <a:rPr lang="en-US" smtClean="0"/>
+              <a:rPr lang="en-US"/>
               <a:t>Fourth level</a:t>
             </a:r>
           </a:p>
           <a:p>
             <a:pPr lvl="4"/>
             <a:r>
-              <a:rPr lang="en-US" smtClean="0"/>
+              <a:rPr lang="en-US"/>
               <a:t>Fifth level</a:t>
             </a:r>
             <a:endParaRPr lang="en-SG"/>
@@ -1677,7 +1682,7 @@
           <a:p>
             <a:fld id="{E085CA00-3891-40E4-8741-D44C4E943D8D}" type="datetimeFigureOut">
               <a:rPr lang="en-SG" smtClean="0"/>
-              <a:t>16/10/2018</a:t>
+              <a:t>10/11/2018</a:t>
             </a:fld>
             <a:endParaRPr lang="en-SG"/>
           </a:p>
@@ -1776,7 +1781,7 @@
           <a:lstStyle/>
           <a:p>
             <a:r>
-              <a:rPr lang="en-US" smtClean="0"/>
+              <a:rPr lang="en-US"/>
               <a:t>Click to edit Master title style</a:t>
             </a:r>
             <a:endParaRPr lang="en-SG"/>
@@ -1842,7 +1847,7 @@
           <a:p>
             <a:pPr lvl="0"/>
             <a:r>
-              <a:rPr lang="en-US" smtClean="0"/>
+              <a:rPr lang="en-US"/>
               <a:t>Edit Master text styles</a:t>
             </a:r>
           </a:p>
@@ -1870,35 +1875,35 @@
           <a:p>
             <a:pPr lvl="0"/>
             <a:r>
-              <a:rPr lang="en-US" smtClean="0"/>
+              <a:rPr lang="en-US"/>
               <a:t>Edit Master text styles</a:t>
             </a:r>
           </a:p>
           <a:p>
             <a:pPr lvl="1"/>
             <a:r>
-              <a:rPr lang="en-US" smtClean="0"/>
+              <a:rPr lang="en-US"/>
               <a:t>Second level</a:t>
             </a:r>
           </a:p>
           <a:p>
             <a:pPr lvl="2"/>
             <a:r>
-              <a:rPr lang="en-US" smtClean="0"/>
+              <a:rPr lang="en-US"/>
               <a:t>Third level</a:t>
             </a:r>
           </a:p>
           <a:p>
             <a:pPr lvl="3"/>
             <a:r>
-              <a:rPr lang="en-US" smtClean="0"/>
+              <a:rPr lang="en-US"/>
               <a:t>Fourth level</a:t>
             </a:r>
           </a:p>
           <a:p>
             <a:pPr lvl="4"/>
             <a:r>
-              <a:rPr lang="en-US" smtClean="0"/>
+              <a:rPr lang="en-US"/>
               <a:t>Fifth level</a:t>
             </a:r>
             <a:endParaRPr lang="en-SG"/>
@@ -1964,7 +1969,7 @@
           <a:p>
             <a:pPr lvl="0"/>
             <a:r>
-              <a:rPr lang="en-US" smtClean="0"/>
+              <a:rPr lang="en-US"/>
               <a:t>Edit Master text styles</a:t>
             </a:r>
           </a:p>
@@ -1992,35 +1997,35 @@
           <a:p>
             <a:pPr lvl="0"/>
             <a:r>
-              <a:rPr lang="en-US" smtClean="0"/>
+              <a:rPr lang="en-US"/>
               <a:t>Edit Master text styles</a:t>
             </a:r>
           </a:p>
           <a:p>
             <a:pPr lvl="1"/>
             <a:r>
-              <a:rPr lang="en-US" smtClean="0"/>
+              <a:rPr lang="en-US"/>
               <a:t>Second level</a:t>
             </a:r>
           </a:p>
           <a:p>
             <a:pPr lvl="2"/>
             <a:r>
-              <a:rPr lang="en-US" smtClean="0"/>
+              <a:rPr lang="en-US"/>
               <a:t>Third level</a:t>
             </a:r>
           </a:p>
           <a:p>
             <a:pPr lvl="3"/>
             <a:r>
-              <a:rPr lang="en-US" smtClean="0"/>
+              <a:rPr lang="en-US"/>
               <a:t>Fourth level</a:t>
             </a:r>
           </a:p>
           <a:p>
             <a:pPr lvl="4"/>
             <a:r>
-              <a:rPr lang="en-US" smtClean="0"/>
+              <a:rPr lang="en-US"/>
               <a:t>Fifth level</a:t>
             </a:r>
             <a:endParaRPr lang="en-SG"/>
@@ -2044,7 +2049,7 @@
           <a:p>
             <a:fld id="{E085CA00-3891-40E4-8741-D44C4E943D8D}" type="datetimeFigureOut">
               <a:rPr lang="en-SG" smtClean="0"/>
-              <a:t>16/10/2018</a:t>
+              <a:t>10/11/2018</a:t>
             </a:fld>
             <a:endParaRPr lang="en-SG"/>
           </a:p>
@@ -2138,7 +2143,7 @@
           <a:lstStyle/>
           <a:p>
             <a:r>
-              <a:rPr lang="en-US" smtClean="0"/>
+              <a:rPr lang="en-US"/>
               <a:t>Click to edit Master title style</a:t>
             </a:r>
             <a:endParaRPr lang="en-SG"/>
@@ -2162,7 +2167,7 @@
           <a:p>
             <a:fld id="{E085CA00-3891-40E4-8741-D44C4E943D8D}" type="datetimeFigureOut">
               <a:rPr lang="en-SG" smtClean="0"/>
-              <a:t>16/10/2018</a:t>
+              <a:t>10/11/2018</a:t>
             </a:fld>
             <a:endParaRPr lang="en-SG"/>
           </a:p>
@@ -2257,7 +2262,7 @@
           <a:p>
             <a:fld id="{E085CA00-3891-40E4-8741-D44C4E943D8D}" type="datetimeFigureOut">
               <a:rPr lang="en-SG" smtClean="0"/>
-              <a:t>16/10/2018</a:t>
+              <a:t>10/11/2018</a:t>
             </a:fld>
             <a:endParaRPr lang="en-SG"/>
           </a:p>
@@ -2360,7 +2365,7 @@
           </a:lstStyle>
           <a:p>
             <a:r>
-              <a:rPr lang="en-US" smtClean="0"/>
+              <a:rPr lang="en-US"/>
               <a:t>Click to edit Master title style</a:t>
             </a:r>
             <a:endParaRPr lang="en-SG"/>
@@ -2417,35 +2422,35 @@
           <a:p>
             <a:pPr lvl="0"/>
             <a:r>
-              <a:rPr lang="en-US" smtClean="0"/>
+              <a:rPr lang="en-US"/>
               <a:t>Edit Master text styles</a:t>
             </a:r>
           </a:p>
           <a:p>
             <a:pPr lvl="1"/>
             <a:r>
-              <a:rPr lang="en-US" smtClean="0"/>
+              <a:rPr lang="en-US"/>
               <a:t>Second level</a:t>
             </a:r>
           </a:p>
           <a:p>
             <a:pPr lvl="2"/>
             <a:r>
-              <a:rPr lang="en-US" smtClean="0"/>
+              <a:rPr lang="en-US"/>
               <a:t>Third level</a:t>
             </a:r>
           </a:p>
           <a:p>
             <a:pPr lvl="3"/>
             <a:r>
-              <a:rPr lang="en-US" smtClean="0"/>
+              <a:rPr lang="en-US"/>
               <a:t>Fourth level</a:t>
             </a:r>
           </a:p>
           <a:p>
             <a:pPr lvl="4"/>
             <a:r>
-              <a:rPr lang="en-US" smtClean="0"/>
+              <a:rPr lang="en-US"/>
               <a:t>Fifth level</a:t>
             </a:r>
             <a:endParaRPr lang="en-SG"/>
@@ -2511,7 +2516,7 @@
           <a:p>
             <a:pPr lvl="0"/>
             <a:r>
-              <a:rPr lang="en-US" smtClean="0"/>
+              <a:rPr lang="en-US"/>
               <a:t>Edit Master text styles</a:t>
             </a:r>
           </a:p>
@@ -2534,7 +2539,7 @@
           <a:p>
             <a:fld id="{E085CA00-3891-40E4-8741-D44C4E943D8D}" type="datetimeFigureOut">
               <a:rPr lang="en-SG" smtClean="0"/>
-              <a:t>16/10/2018</a:t>
+              <a:t>10/11/2018</a:t>
             </a:fld>
             <a:endParaRPr lang="en-SG"/>
           </a:p>
@@ -2637,7 +2642,7 @@
           </a:lstStyle>
           <a:p>
             <a:r>
-              <a:rPr lang="en-US" smtClean="0"/>
+              <a:rPr lang="en-US"/>
               <a:t>Click to edit Master title style</a:t>
             </a:r>
             <a:endParaRPr lang="en-SG"/>
@@ -2764,7 +2769,7 @@
           <a:p>
             <a:pPr lvl="0"/>
             <a:r>
-              <a:rPr lang="en-US" smtClean="0"/>
+              <a:rPr lang="en-US"/>
               <a:t>Edit Master text styles</a:t>
             </a:r>
           </a:p>
@@ -2787,7 +2792,7 @@
           <a:p>
             <a:fld id="{E085CA00-3891-40E4-8741-D44C4E943D8D}" type="datetimeFigureOut">
               <a:rPr lang="en-SG" smtClean="0"/>
-              <a:t>16/10/2018</a:t>
+              <a:t>10/11/2018</a:t>
             </a:fld>
             <a:endParaRPr lang="en-SG"/>
           </a:p>
@@ -2896,7 +2901,7 @@
           <a:lstStyle/>
           <a:p>
             <a:r>
-              <a:rPr lang="en-US" smtClean="0"/>
+              <a:rPr lang="en-US"/>
               <a:t>Click to edit Master title style</a:t>
             </a:r>
             <a:endParaRPr lang="en-SG"/>
@@ -2930,35 +2935,35 @@
           <a:p>
             <a:pPr lvl="0"/>
             <a:r>
-              <a:rPr lang="en-US" smtClean="0"/>
+              <a:rPr lang="en-US"/>
               <a:t>Edit Master text styles</a:t>
             </a:r>
           </a:p>
           <a:p>
             <a:pPr lvl="1"/>
             <a:r>
-              <a:rPr lang="en-US" smtClean="0"/>
+              <a:rPr lang="en-US"/>
               <a:t>Second level</a:t>
             </a:r>
           </a:p>
           <a:p>
             <a:pPr lvl="2"/>
             <a:r>
-              <a:rPr lang="en-US" smtClean="0"/>
+              <a:rPr lang="en-US"/>
               <a:t>Third level</a:t>
             </a:r>
           </a:p>
           <a:p>
             <a:pPr lvl="3"/>
             <a:r>
-              <a:rPr lang="en-US" smtClean="0"/>
+              <a:rPr lang="en-US"/>
               <a:t>Fourth level</a:t>
             </a:r>
           </a:p>
           <a:p>
             <a:pPr lvl="4"/>
             <a:r>
-              <a:rPr lang="en-US" smtClean="0"/>
+              <a:rPr lang="en-US"/>
               <a:t>Fifth level</a:t>
             </a:r>
             <a:endParaRPr lang="en-SG"/>
@@ -3000,7 +3005,7 @@
           <a:p>
             <a:fld id="{E085CA00-3891-40E4-8741-D44C4E943D8D}" type="datetimeFigureOut">
               <a:rPr lang="en-SG" smtClean="0"/>
-              <a:t>16/10/2018</a:t>
+              <a:t>10/11/2018</a:t>
             </a:fld>
             <a:endParaRPr lang="en-SG"/>
           </a:p>
@@ -3685,8 +3690,8 @@
         </p:nvSpPr>
         <p:spPr>
           <a:xfrm>
-            <a:off x="4774712" y="1428861"/>
-            <a:ext cx="1219200" cy="467684"/>
+            <a:off x="4774711" y="1428861"/>
+            <a:ext cx="1242071" cy="467684"/>
           </a:xfrm>
           <a:prstGeom prst="rect">
             <a:avLst/>
@@ -3726,18 +3731,15 @@
                   <a:schemeClr val="bg1"/>
                 </a:solidFill>
               </a:rPr>
-              <a:t>:Address</a:t>
-            </a:r>
-          </a:p>
-          <a:p>
-            <a:pPr algn="ctr"/>
+              <a:t>:</a:t>
+            </a:r>
             <a:r>
               <a:rPr lang="en-US" sz="1600" dirty="0" err="1">
                 <a:solidFill>
                   <a:schemeClr val="bg1"/>
                 </a:solidFill>
               </a:rPr>
-              <a:t>BookParser</a:t>
+              <a:t>TutorHelperParser</a:t>
             </a:r>
             <a:endParaRPr lang="en-SG" sz="1600" dirty="0">
               <a:solidFill>
@@ -3944,21 +3946,8 @@
                   <a:srgbClr val="0070C0"/>
                 </a:solidFill>
               </a:rPr>
-              <a:t>execute</a:t>
-            </a:r>
-            <a:r>
-              <a:rPr lang="en-US" sz="1100" dirty="0">
-                <a:solidFill>
-                  <a:srgbClr val="0070C0"/>
-                </a:solidFill>
-              </a:rPr>
-              <a:t>(“addsub 1 s/English”)</a:t>
-            </a:r>
-            <a:endParaRPr lang="en-US" sz="1100" dirty="0">
-              <a:solidFill>
-                <a:srgbClr val="0070C0"/>
-              </a:solidFill>
-            </a:endParaRPr>
+              <a:t>execute(“addsub 1 s/English”)</a:t>
+            </a:r>
           </a:p>
         </p:txBody>
       </p:sp>
@@ -4189,13 +4178,8 @@
           <a:p>
             <a:r>
               <a:rPr lang="en-US" sz="1100" dirty="0"/>
-              <a:t>parseCommand</a:t>
-            </a:r>
-            <a:r>
-              <a:rPr lang="en-US" sz="1100" dirty="0"/>
-              <a:t>(“addsub 1 s/English”)</a:t>
-            </a:r>
-            <a:endParaRPr lang="en-US" sz="1100" dirty="0"/>
+              <a:t>parseCommand(“addsub 1 s/English”)</a:t>
+            </a:r>
           </a:p>
         </p:txBody>
       </p:sp>
@@ -4938,11 +4922,6 @@
               </a:rPr>
               <a:t>addSubject(p, “English”)</a:t>
             </a:r>
-            <a:endParaRPr lang="en-US" dirty="0">
-              <a:solidFill>
-                <a:srgbClr val="7030A0"/>
-              </a:solidFill>
-            </a:endParaRPr>
           </a:p>
         </p:txBody>
       </p:sp>
@@ -5142,13 +5121,6 @@
   <p:clrMapOvr>
     <a:masterClrMapping/>
   </p:clrMapOvr>
-  <p:timing>
-    <p:tnLst>
-      <p:par>
-        <p:cTn id="1" dur="indefinite" restart="never" nodeType="tmRoot"/>
-      </p:par>
-    </p:tnLst>
-  </p:timing>
 </p:sld>
 </file>
 

</xml_diff>